<commit_message>
Add links back to blog series
</commit_message>
<xml_diff>
--- a/Lightning Talk - An Introduction to Querying XML With T-SQL.pptx
+++ b/Lightning Talk - An Introduction to Querying XML With T-SQL.pptx
@@ -128,7 +128,7 @@
 <file path=ppt/revisionInfo.xml><?xml version="1.0" encoding="utf-8"?>
 <p1510:revInfo xmlns:a="http://schemas.openxmlformats.org/drawingml/2006/main" xmlns:r="http://schemas.openxmlformats.org/officeDocument/2006/relationships" xmlns:p1510="http://schemas.microsoft.com/office/powerpoint/2015/10/main">
   <p1510:revLst>
-    <p1510:client id="{9E5FA5E3-95A2-4B1F-92FC-32A189B3BF82}" v="181" dt="2021-05-22T15:40:35.245"/>
+    <p1510:client id="{9E5FA5E3-95A2-4B1F-92FC-32A189B3BF82}" v="184" dt="2021-05-22T19:05:25.195"/>
   </p1510:revLst>
 </p1510:revInfo>
 </file>
@@ -138,12 +138,12 @@
   <pc:docChgLst>
     <pc:chgData name="Barney Lawrence" userId="993b92e47e495d54" providerId="LiveId" clId="{9E5FA5E3-95A2-4B1F-92FC-32A189B3BF82}"/>
     <pc:docChg chg="undo custSel addSld delSld modSld">
-      <pc:chgData name="Barney Lawrence" userId="993b92e47e495d54" providerId="LiveId" clId="{9E5FA5E3-95A2-4B1F-92FC-32A189B3BF82}" dt="2021-05-22T18:34:15.503" v="561" actId="1076"/>
+      <pc:chgData name="Barney Lawrence" userId="993b92e47e495d54" providerId="LiveId" clId="{9E5FA5E3-95A2-4B1F-92FC-32A189B3BF82}" dt="2021-05-22T19:07:12.414" v="579" actId="1076"/>
       <pc:docMkLst>
         <pc:docMk/>
       </pc:docMkLst>
-      <pc:sldChg chg="modSp mod">
-        <pc:chgData name="Barney Lawrence" userId="993b92e47e495d54" providerId="LiveId" clId="{9E5FA5E3-95A2-4B1F-92FC-32A189B3BF82}" dt="2021-05-22T18:34:15.503" v="561" actId="1076"/>
+      <pc:sldChg chg="addSp modSp mod">
+        <pc:chgData name="Barney Lawrence" userId="993b92e47e495d54" providerId="LiveId" clId="{9E5FA5E3-95A2-4B1F-92FC-32A189B3BF82}" dt="2021-05-22T19:07:12.414" v="579" actId="1076"/>
         <pc:sldMkLst>
           <pc:docMk/>
           <pc:sldMk cId="2513921360" sldId="256"/>
@@ -157,13 +157,37 @@
           </ac:spMkLst>
         </pc:spChg>
         <pc:spChg chg="mod">
-          <ac:chgData name="Barney Lawrence" userId="993b92e47e495d54" providerId="LiveId" clId="{9E5FA5E3-95A2-4B1F-92FC-32A189B3BF82}" dt="2021-05-22T18:34:15.503" v="561" actId="1076"/>
+          <ac:chgData name="Barney Lawrence" userId="993b92e47e495d54" providerId="LiveId" clId="{9E5FA5E3-95A2-4B1F-92FC-32A189B3BF82}" dt="2021-05-22T19:02:34.468" v="562" actId="1076"/>
           <ac:spMkLst>
             <pc:docMk/>
             <pc:sldMk cId="2513921360" sldId="256"/>
             <ac:spMk id="3" creationId="{5E2BC4E4-4417-4529-B841-CDBACCC63DB7}"/>
           </ac:spMkLst>
         </pc:spChg>
+        <pc:spChg chg="add mod">
+          <ac:chgData name="Barney Lawrence" userId="993b92e47e495d54" providerId="LiveId" clId="{9E5FA5E3-95A2-4B1F-92FC-32A189B3BF82}" dt="2021-05-22T19:07:12.414" v="579" actId="1076"/>
+          <ac:spMkLst>
+            <pc:docMk/>
+            <pc:sldMk cId="2513921360" sldId="256"/>
+            <ac:spMk id="6" creationId="{3BD2DF90-3EFD-4DF0-8176-9814910A61A8}"/>
+          </ac:spMkLst>
+        </pc:spChg>
+        <pc:spChg chg="add mod">
+          <ac:chgData name="Barney Lawrence" userId="993b92e47e495d54" providerId="LiveId" clId="{9E5FA5E3-95A2-4B1F-92FC-32A189B3BF82}" dt="2021-05-22T19:07:12.414" v="579" actId="1076"/>
+          <ac:spMkLst>
+            <pc:docMk/>
+            <pc:sldMk cId="2513921360" sldId="256"/>
+            <ac:spMk id="10" creationId="{D8599FE1-AF8D-4CDB-B732-496E0878D042}"/>
+          </ac:spMkLst>
+        </pc:spChg>
+        <pc:picChg chg="add mod">
+          <ac:chgData name="Barney Lawrence" userId="993b92e47e495d54" providerId="LiveId" clId="{9E5FA5E3-95A2-4B1F-92FC-32A189B3BF82}" dt="2021-05-22T19:04:09.929" v="570" actId="1076"/>
+          <ac:picMkLst>
+            <pc:docMk/>
+            <pc:sldMk cId="2513921360" sldId="256"/>
+            <ac:picMk id="8" creationId="{0F651652-7374-48CC-A27D-159A1E01A654}"/>
+          </ac:picMkLst>
+        </pc:picChg>
       </pc:sldChg>
       <pc:sldChg chg="del">
         <pc:chgData name="Barney Lawrence" userId="993b92e47e495d54" providerId="LiveId" clId="{9E5FA5E3-95A2-4B1F-92FC-32A189B3BF82}" dt="2021-05-22T10:52:14.897" v="0" actId="47"/>
@@ -735,7 +759,7 @@
         </pc:sldMkLst>
       </pc:sldChg>
       <pc:sldChg chg="addSp delSp modSp add mod delAnim modAnim">
-        <pc:chgData name="Barney Lawrence" userId="993b92e47e495d54" providerId="LiveId" clId="{9E5FA5E3-95A2-4B1F-92FC-32A189B3BF82}" dt="2021-05-22T15:40:35.245" v="558"/>
+        <pc:chgData name="Barney Lawrence" userId="993b92e47e495d54" providerId="LiveId" clId="{9E5FA5E3-95A2-4B1F-92FC-32A189B3BF82}" dt="2021-05-22T19:05:25.195" v="575"/>
         <pc:sldMkLst>
           <pc:docMk/>
           <pc:sldMk cId="3149118441" sldId="270"/>
@@ -796,6 +820,14 @@
             <ac:spMk id="13" creationId="{35BB6847-183D-4344-9F83-53AFA7A3DB2C}"/>
           </ac:spMkLst>
         </pc:spChg>
+        <pc:picChg chg="add mod">
+          <ac:chgData name="Barney Lawrence" userId="993b92e47e495d54" providerId="LiveId" clId="{9E5FA5E3-95A2-4B1F-92FC-32A189B3BF82}" dt="2021-05-22T19:05:15.929" v="574" actId="1076"/>
+          <ac:picMkLst>
+            <pc:docMk/>
+            <pc:sldMk cId="3149118441" sldId="270"/>
+            <ac:picMk id="14" creationId="{42280260-4208-479B-A4BD-D34177DEB782}"/>
+          </ac:picMkLst>
+        </pc:picChg>
       </pc:sldChg>
     </pc:docChg>
   </pc:docChgLst>
@@ -4159,7 +4191,7 @@
         </p:nvSpPr>
         <p:spPr>
           <a:xfrm>
-            <a:off x="422979" y="5524300"/>
+            <a:off x="379810" y="5127930"/>
             <a:ext cx="3689859" cy="860805"/>
           </a:xfrm>
         </p:spPr>
@@ -4399,6 +4431,114 @@
                 <a:cs typeface="Courier New" panose="02070309020205020404" pitchFamily="49" charset="0"/>
               </a:rPr>
               <a:t>An Introduction to Querying</a:t>
+            </a:r>
+          </a:p>
+        </p:txBody>
+      </p:sp>
+      <p:sp>
+        <p:nvSpPr>
+          <p:cNvPr id="6" name="TextBox 5">
+            <a:extLst>
+              <a:ext uri="{FF2B5EF4-FFF2-40B4-BE49-F238E27FC236}">
+                <a16:creationId xmlns:a16="http://schemas.microsoft.com/office/drawing/2014/main" id="{3BD2DF90-3EFD-4DF0-8176-9814910A61A8}"/>
+              </a:ext>
+            </a:extLst>
+          </p:cNvPr>
+          <p:cNvSpPr txBox="1"/>
+          <p:nvPr/>
+        </p:nvSpPr>
+        <p:spPr>
+          <a:xfrm>
+            <a:off x="379810" y="6204360"/>
+            <a:ext cx="6237934" cy="369332"/>
+          </a:xfrm>
+          <a:prstGeom prst="rect">
+            <a:avLst/>
+          </a:prstGeom>
+          <a:noFill/>
+        </p:spPr>
+        <p:txBody>
+          <a:bodyPr wrap="square">
+            <a:spAutoFit/>
+          </a:bodyPr>
+          <a:lstStyle/>
+          <a:p>
+            <a:r>
+              <a:rPr lang="en-GB" dirty="0">
+                <a:solidFill>
+                  <a:schemeClr val="bg1"/>
+                </a:solidFill>
+              </a:rPr>
+              <a:t>https://github.com/BarneyLawrence/XML-Queries-In-SQL-Server</a:t>
+            </a:r>
+          </a:p>
+        </p:txBody>
+      </p:sp>
+      <p:pic>
+        <p:nvPicPr>
+          <p:cNvPr id="8" name="Picture 7" descr="Qr code&#10;&#10;Description automatically generated">
+            <a:extLst>
+              <a:ext uri="{FF2B5EF4-FFF2-40B4-BE49-F238E27FC236}">
+                <a16:creationId xmlns:a16="http://schemas.microsoft.com/office/drawing/2014/main" id="{0F651652-7374-48CC-A27D-159A1E01A654}"/>
+              </a:ext>
+            </a:extLst>
+          </p:cNvPr>
+          <p:cNvPicPr>
+            <a:picLocks noChangeAspect="1"/>
+          </p:cNvPicPr>
+          <p:nvPr/>
+        </p:nvPicPr>
+        <p:blipFill>
+          <a:blip r:embed="rId2"/>
+          <a:stretch>
+            <a:fillRect/>
+          </a:stretch>
+        </p:blipFill>
+        <p:spPr>
+          <a:xfrm>
+            <a:off x="8740843" y="3578836"/>
+            <a:ext cx="2857500" cy="2857500"/>
+          </a:xfrm>
+          <a:prstGeom prst="rect">
+            <a:avLst/>
+          </a:prstGeom>
+        </p:spPr>
+      </p:pic>
+      <p:sp>
+        <p:nvSpPr>
+          <p:cNvPr id="10" name="TextBox 9">
+            <a:extLst>
+              <a:ext uri="{FF2B5EF4-FFF2-40B4-BE49-F238E27FC236}">
+                <a16:creationId xmlns:a16="http://schemas.microsoft.com/office/drawing/2014/main" id="{D8599FE1-AF8D-4CDB-B732-496E0878D042}"/>
+              </a:ext>
+            </a:extLst>
+          </p:cNvPr>
+          <p:cNvSpPr txBox="1"/>
+          <p:nvPr/>
+        </p:nvSpPr>
+        <p:spPr>
+          <a:xfrm>
+            <a:off x="379810" y="5941425"/>
+            <a:ext cx="6237934" cy="369332"/>
+          </a:xfrm>
+          <a:prstGeom prst="rect">
+            <a:avLst/>
+          </a:prstGeom>
+          <a:noFill/>
+        </p:spPr>
+        <p:txBody>
+          <a:bodyPr wrap="square">
+            <a:spAutoFit/>
+          </a:bodyPr>
+          <a:lstStyle/>
+          <a:p>
+            <a:r>
+              <a:rPr lang="en-GB" dirty="0">
+                <a:solidFill>
+                  <a:schemeClr val="bg1"/>
+                </a:solidFill>
+              </a:rPr>
+              <a:t>https://barneylawrence.com/category/xml/</a:t>
             </a:r>
           </a:p>
         </p:txBody>
@@ -16073,6 +16213,36 @@
           </a:p>
         </p:txBody>
       </p:sp>
+      <p:pic>
+        <p:nvPicPr>
+          <p:cNvPr id="14" name="Picture 13" descr="Qr code&#10;&#10;Description automatically generated">
+            <a:extLst>
+              <a:ext uri="{FF2B5EF4-FFF2-40B4-BE49-F238E27FC236}">
+                <a16:creationId xmlns:a16="http://schemas.microsoft.com/office/drawing/2014/main" id="{42280260-4208-479B-A4BD-D34177DEB782}"/>
+              </a:ext>
+            </a:extLst>
+          </p:cNvPr>
+          <p:cNvPicPr>
+            <a:picLocks noChangeAspect="1"/>
+          </p:cNvPicPr>
+          <p:nvPr/>
+        </p:nvPicPr>
+        <p:blipFill>
+          <a:blip r:embed="rId2"/>
+          <a:stretch>
+            <a:fillRect/>
+          </a:stretch>
+        </p:blipFill>
+        <p:spPr>
+          <a:xfrm>
+            <a:off x="9875288" y="4609760"/>
+            <a:ext cx="1891807" cy="1891807"/>
+          </a:xfrm>
+          <a:prstGeom prst="rect">
+            <a:avLst/>
+          </a:prstGeom>
+        </p:spPr>
+      </p:pic>
     </p:spTree>
     <p:extLst>
       <p:ext uri="{BB962C8B-B14F-4D97-AF65-F5344CB8AC3E}">
@@ -16277,6 +16447,51 @@
                                       </p:cBhvr>
                                       <p:to>
                                         <p:strVal val="hidden"/>
+                                      </p:to>
+                                    </p:set>
+                                  </p:childTnLst>
+                                </p:cTn>
+                              </p:par>
+                            </p:childTnLst>
+                          </p:cTn>
+                        </p:par>
+                      </p:childTnLst>
+                    </p:cTn>
+                  </p:par>
+                  <p:par>
+                    <p:cTn id="19" fill="hold">
+                      <p:stCondLst>
+                        <p:cond delay="indefinite"/>
+                      </p:stCondLst>
+                      <p:childTnLst>
+                        <p:par>
+                          <p:cTn id="20" fill="hold">
+                            <p:stCondLst>
+                              <p:cond delay="0"/>
+                            </p:stCondLst>
+                            <p:childTnLst>
+                              <p:par>
+                                <p:cTn id="21" presetID="1" presetClass="entr" presetSubtype="0" fill="hold" nodeType="clickEffect">
+                                  <p:stCondLst>
+                                    <p:cond delay="0"/>
+                                  </p:stCondLst>
+                                  <p:childTnLst>
+                                    <p:set>
+                                      <p:cBhvr>
+                                        <p:cTn id="22" dur="1" fill="hold">
+                                          <p:stCondLst>
+                                            <p:cond delay="0"/>
+                                          </p:stCondLst>
+                                        </p:cTn>
+                                        <p:tgtEl>
+                                          <p:spTgt spid="14"/>
+                                        </p:tgtEl>
+                                        <p:attrNameLst>
+                                          <p:attrName>style.visibility</p:attrName>
+                                        </p:attrNameLst>
+                                      </p:cBhvr>
+                                      <p:to>
+                                        <p:strVal val="visible"/>
                                       </p:to>
                                     </p:set>
                                   </p:childTnLst>

</xml_diff>

<commit_message>
Update to hyperlinks for DataMinutes
</commit_message>
<xml_diff>
--- a/Lightning Talk - An Introduction to Querying XML With T-SQL.pptx
+++ b/Lightning Talk - An Introduction to Querying XML With T-SQL.pptx
@@ -135,7 +135,7 @@
 <file path=ppt/revisionInfo.xml><?xml version="1.0" encoding="utf-8"?>
 <p1510:revInfo xmlns:a="http://schemas.openxmlformats.org/drawingml/2006/main" xmlns:r="http://schemas.openxmlformats.org/officeDocument/2006/relationships" xmlns:p1510="http://schemas.microsoft.com/office/powerpoint/2015/10/main">
   <p1510:revLst>
-    <p1510:client id="{9E5FA5E3-95A2-4B1F-92FC-32A189B3BF82}" v="525" dt="2021-06-10T20:27:39.352"/>
+    <p1510:client id="{9E5FA5E3-95A2-4B1F-92FC-32A189B3BF82}" v="529" dt="2021-06-11T11:38:03.013"/>
   </p1510:revLst>
 </p1510:revInfo>
 </file>
@@ -145,12 +145,12 @@
   <pc:docChgLst>
     <pc:chgData name="Barney Lawrence" userId="993b92e47e495d54" providerId="LiveId" clId="{9E5FA5E3-95A2-4B1F-92FC-32A189B3BF82}"/>
     <pc:docChg chg="undo custSel addSld delSld modSld">
-      <pc:chgData name="Barney Lawrence" userId="993b92e47e495d54" providerId="LiveId" clId="{9E5FA5E3-95A2-4B1F-92FC-32A189B3BF82}" dt="2021-06-10T20:30:40.328" v="1610" actId="465"/>
+      <pc:chgData name="Barney Lawrence" userId="993b92e47e495d54" providerId="LiveId" clId="{9E5FA5E3-95A2-4B1F-92FC-32A189B3BF82}" dt="2021-06-11T11:38:03.013" v="1619"/>
       <pc:docMkLst>
         <pc:docMk/>
       </pc:docMkLst>
       <pc:sldChg chg="addSp modSp mod">
-        <pc:chgData name="Barney Lawrence" userId="993b92e47e495d54" providerId="LiveId" clId="{9E5FA5E3-95A2-4B1F-92FC-32A189B3BF82}" dt="2021-05-28T14:32:41.219" v="1062" actId="207"/>
+        <pc:chgData name="Barney Lawrence" userId="993b92e47e495d54" providerId="LiveId" clId="{9E5FA5E3-95A2-4B1F-92FC-32A189B3BF82}" dt="2021-06-11T11:37:32.429" v="1615" actId="207"/>
         <pc:sldMkLst>
           <pc:docMk/>
           <pc:sldMk cId="2513921360" sldId="256"/>
@@ -172,7 +172,7 @@
           </ac:spMkLst>
         </pc:spChg>
         <pc:spChg chg="add mod">
-          <ac:chgData name="Barney Lawrence" userId="993b92e47e495d54" providerId="LiveId" clId="{9E5FA5E3-95A2-4B1F-92FC-32A189B3BF82}" dt="2021-05-28T14:32:36.262" v="1061" actId="207"/>
+          <ac:chgData name="Barney Lawrence" userId="993b92e47e495d54" providerId="LiveId" clId="{9E5FA5E3-95A2-4B1F-92FC-32A189B3BF82}" dt="2021-06-11T11:36:53.923" v="1614" actId="207"/>
           <ac:spMkLst>
             <pc:docMk/>
             <pc:sldMk cId="2513921360" sldId="256"/>
@@ -180,7 +180,7 @@
           </ac:spMkLst>
         </pc:spChg>
         <pc:spChg chg="add mod">
-          <ac:chgData name="Barney Lawrence" userId="993b92e47e495d54" providerId="LiveId" clId="{9E5FA5E3-95A2-4B1F-92FC-32A189B3BF82}" dt="2021-05-28T14:32:24.728" v="1060" actId="207"/>
+          <ac:chgData name="Barney Lawrence" userId="993b92e47e495d54" providerId="LiveId" clId="{9E5FA5E3-95A2-4B1F-92FC-32A189B3BF82}" dt="2021-06-11T11:37:32.429" v="1615" actId="207"/>
           <ac:spMkLst>
             <pc:docMk/>
             <pc:sldMk cId="2513921360" sldId="256"/>
@@ -188,7 +188,7 @@
           </ac:spMkLst>
         </pc:spChg>
         <pc:spChg chg="add mod">
-          <ac:chgData name="Barney Lawrence" userId="993b92e47e495d54" providerId="LiveId" clId="{9E5FA5E3-95A2-4B1F-92FC-32A189B3BF82}" dt="2021-05-28T14:32:41.219" v="1062" actId="207"/>
+          <ac:chgData name="Barney Lawrence" userId="993b92e47e495d54" providerId="LiveId" clId="{9E5FA5E3-95A2-4B1F-92FC-32A189B3BF82}" dt="2021-06-11T11:36:38.223" v="1613" actId="115"/>
           <ac:spMkLst>
             <pc:docMk/>
             <pc:sldMk cId="2513921360" sldId="256"/>
@@ -1517,12 +1517,60 @@
           <pc:sldMk cId="2452190464" sldId="277"/>
         </pc:sldMkLst>
       </pc:sldChg>
-      <pc:sldChg chg="add">
-        <pc:chgData name="Barney Lawrence" userId="993b92e47e495d54" providerId="LiveId" clId="{9E5FA5E3-95A2-4B1F-92FC-32A189B3BF82}" dt="2021-06-04T15:06:17.968" v="1519"/>
+      <pc:sldChg chg="addSp delSp modSp add mod">
+        <pc:chgData name="Barney Lawrence" userId="993b92e47e495d54" providerId="LiveId" clId="{9E5FA5E3-95A2-4B1F-92FC-32A189B3BF82}" dt="2021-06-11T11:38:03.013" v="1619"/>
         <pc:sldMkLst>
           <pc:docMk/>
           <pc:sldMk cId="1475966051" sldId="278"/>
         </pc:sldMkLst>
+        <pc:spChg chg="del mod">
+          <ac:chgData name="Barney Lawrence" userId="993b92e47e495d54" providerId="LiveId" clId="{9E5FA5E3-95A2-4B1F-92FC-32A189B3BF82}" dt="2021-06-11T11:38:02.442" v="1618" actId="478"/>
+          <ac:spMkLst>
+            <pc:docMk/>
+            <pc:sldMk cId="1475966051" sldId="278"/>
+            <ac:spMk id="6" creationId="{3BD2DF90-3EFD-4DF0-8176-9814910A61A8}"/>
+          </ac:spMkLst>
+        </pc:spChg>
+        <pc:spChg chg="del">
+          <ac:chgData name="Barney Lawrence" userId="993b92e47e495d54" providerId="LiveId" clId="{9E5FA5E3-95A2-4B1F-92FC-32A189B3BF82}" dt="2021-06-11T11:37:56.712" v="1616" actId="478"/>
+          <ac:spMkLst>
+            <pc:docMk/>
+            <pc:sldMk cId="1475966051" sldId="278"/>
+            <ac:spMk id="9" creationId="{3BEEB7D4-FD64-4522-A65E-FCD81DEC35CD}"/>
+          </ac:spMkLst>
+        </pc:spChg>
+        <pc:spChg chg="del">
+          <ac:chgData name="Barney Lawrence" userId="993b92e47e495d54" providerId="LiveId" clId="{9E5FA5E3-95A2-4B1F-92FC-32A189B3BF82}" dt="2021-06-11T11:37:56.712" v="1616" actId="478"/>
+          <ac:spMkLst>
+            <pc:docMk/>
+            <pc:sldMk cId="1475966051" sldId="278"/>
+            <ac:spMk id="10" creationId="{D8599FE1-AF8D-4CDB-B732-496E0878D042}"/>
+          </ac:spMkLst>
+        </pc:spChg>
+        <pc:spChg chg="add mod">
+          <ac:chgData name="Barney Lawrence" userId="993b92e47e495d54" providerId="LiveId" clId="{9E5FA5E3-95A2-4B1F-92FC-32A189B3BF82}" dt="2021-06-11T11:38:03.013" v="1619"/>
+          <ac:spMkLst>
+            <pc:docMk/>
+            <pc:sldMk cId="1475966051" sldId="278"/>
+            <ac:spMk id="11" creationId="{B2B2729D-D84E-48E6-B116-7FBDC8C5FCB6}"/>
+          </ac:spMkLst>
+        </pc:spChg>
+        <pc:spChg chg="add mod">
+          <ac:chgData name="Barney Lawrence" userId="993b92e47e495d54" providerId="LiveId" clId="{9E5FA5E3-95A2-4B1F-92FC-32A189B3BF82}" dt="2021-06-11T11:38:03.013" v="1619"/>
+          <ac:spMkLst>
+            <pc:docMk/>
+            <pc:sldMk cId="1475966051" sldId="278"/>
+            <ac:spMk id="12" creationId="{4B152674-3832-4270-8A03-446930DF4B15}"/>
+          </ac:spMkLst>
+        </pc:spChg>
+        <pc:spChg chg="add mod">
+          <ac:chgData name="Barney Lawrence" userId="993b92e47e495d54" providerId="LiveId" clId="{9E5FA5E3-95A2-4B1F-92FC-32A189B3BF82}" dt="2021-06-11T11:38:03.013" v="1619"/>
+          <ac:spMkLst>
+            <pc:docMk/>
+            <pc:sldMk cId="1475966051" sldId="278"/>
+            <ac:spMk id="13" creationId="{032792EF-B0A8-4A22-A9FF-74A0ED304B49}"/>
+          </ac:spMkLst>
+        </pc:spChg>
       </pc:sldChg>
     </pc:docChg>
   </pc:docChgLst>
@@ -1730,7 +1778,7 @@
             <a:fld id="{5586B75A-687E-405C-8A0B-8D00578BA2C3}" type="datetimeFigureOut">
               <a:rPr lang="en-US" dirty="0"/>
               <a:pPr/>
-              <a:t>6/10/2021</a:t>
+              <a:t>6/11/2021</a:t>
             </a:fld>
             <a:endParaRPr lang="en-US" dirty="0"/>
           </a:p>
@@ -1916,7 +1964,7 @@
           <a:p>
             <a:fld id="{5F4E5243-F52A-4D37-9694-EB26C6C31910}" type="datetimeFigureOut">
               <a:rPr lang="en-US" dirty="0"/>
-              <a:t>6/10/2021</a:t>
+              <a:t>6/11/2021</a:t>
             </a:fld>
             <a:endParaRPr lang="en-US" dirty="0"/>
           </a:p>
@@ -2091,7 +2139,7 @@
           <a:p>
             <a:fld id="{3A77B6E1-634A-48DC-9E8B-D894023267EF}" type="datetimeFigureOut">
               <a:rPr lang="en-US" dirty="0"/>
-              <a:t>6/10/2021</a:t>
+              <a:t>6/11/2021</a:t>
             </a:fld>
             <a:endParaRPr lang="en-US" dirty="0"/>
           </a:p>
@@ -2256,7 +2304,7 @@
           <a:p>
             <a:fld id="{7B2D3E9E-A95C-48F2-B4BF-A71542E0BE9A}" type="datetimeFigureOut">
               <a:rPr lang="en-US" dirty="0"/>
-              <a:t>6/10/2021</a:t>
+              <a:t>6/11/2021</a:t>
             </a:fld>
             <a:endParaRPr lang="en-US" dirty="0"/>
           </a:p>
@@ -2508,7 +2556,7 @@
             <a:fld id="{5586B75A-687E-405C-8A0B-8D00578BA2C3}" type="datetimeFigureOut">
               <a:rPr lang="en-US" dirty="0"/>
               <a:pPr/>
-              <a:t>6/10/2021</a:t>
+              <a:t>6/11/2021</a:t>
             </a:fld>
             <a:endParaRPr lang="en-US" dirty="0"/>
           </a:p>
@@ -2792,7 +2840,7 @@
           <a:p>
             <a:fld id="{F12952B5-7A2F-4CC8-B7CE-9234E21C2837}" type="datetimeFigureOut">
               <a:rPr lang="en-US" dirty="0"/>
-              <a:t>6/10/2021</a:t>
+              <a:t>6/11/2021</a:t>
             </a:fld>
             <a:endParaRPr lang="en-US" dirty="0"/>
           </a:p>
@@ -3225,7 +3273,7 @@
           <a:p>
             <a:fld id="{CE1DA07A-9201-4B4B-BAF2-015AFA30F520}" type="datetimeFigureOut">
               <a:rPr lang="en-US" dirty="0"/>
-              <a:t>6/10/2021</a:t>
+              <a:t>6/11/2021</a:t>
             </a:fld>
             <a:endParaRPr lang="en-US" dirty="0"/>
           </a:p>
@@ -3338,7 +3386,7 @@
           <a:p>
             <a:fld id="{73D7E00A-486F-4252-8B1D-E32645521F49}" type="datetimeFigureOut">
               <a:rPr lang="en-US" dirty="0"/>
-              <a:t>6/10/2021</a:t>
+              <a:t>6/11/2021</a:t>
             </a:fld>
             <a:endParaRPr lang="en-US" dirty="0"/>
           </a:p>
@@ -3428,7 +3476,7 @@
           <a:p>
             <a:fld id="{8DDF5F92-E675-4B36-9A60-69A962A68675}" type="datetimeFigureOut">
               <a:rPr lang="en-US" dirty="0"/>
-              <a:t>6/10/2021</a:t>
+              <a:t>6/11/2021</a:t>
             </a:fld>
             <a:endParaRPr lang="en-US" dirty="0"/>
           </a:p>
@@ -3779,7 +3827,7 @@
           <a:p>
             <a:fld id="{AF6E2C9B-5FA2-460D-9BE7-B0812FC2A6FF}" type="datetimeFigureOut">
               <a:rPr lang="en-US" dirty="0"/>
-              <a:t>6/10/2021</a:t>
+              <a:t>6/11/2021</a:t>
             </a:fld>
             <a:endParaRPr lang="en-US" dirty="0"/>
           </a:p>
@@ -4092,7 +4140,7 @@
             <a:fld id="{5586B75A-687E-405C-8A0B-8D00578BA2C3}" type="datetimeFigureOut">
               <a:rPr lang="en-US" dirty="0"/>
               <a:pPr/>
-              <a:t>6/10/2021</a:t>
+              <a:t>6/11/2021</a:t>
             </a:fld>
             <a:endParaRPr lang="en-US" dirty="0"/>
           </a:p>
@@ -4322,7 +4370,7 @@
             <a:fld id="{5586B75A-687E-405C-8A0B-8D00578BA2C3}" type="datetimeFigureOut">
               <a:rPr lang="en-US" dirty="0"/>
               <a:pPr/>
-              <a:t>6/10/2021</a:t>
+              <a:t>6/11/2021</a:t>
             </a:fld>
             <a:endParaRPr lang="en-US" dirty="0"/>
           </a:p>
@@ -5168,8 +5216,28 @@
                   <a:schemeClr val="bg1"/>
                 </a:solidFill>
               </a:rPr>
-              <a:t>	github.com/BarneyLawrence/XML-Queries-In-SQL-Server</a:t>
-            </a:r>
+              <a:t>	</a:t>
+            </a:r>
+            <a:r>
+              <a:rPr lang="en-GB" dirty="0">
+                <a:solidFill>
+                  <a:schemeClr val="bg1"/>
+                </a:solidFill>
+                <a:hlinkClick r:id="rId2">
+                  <a:extLst>
+                    <a:ext uri="{A12FA001-AC4F-418D-AE19-62706E023703}">
+                      <ahyp:hlinkClr xmlns:ahyp="http://schemas.microsoft.com/office/drawing/2018/hyperlinkcolor" val="tx"/>
+                    </a:ext>
+                  </a:extLst>
+                </a:hlinkClick>
+              </a:rPr>
+              <a:t>github.com/BarneyLawrence/XML-Queries-In-SQL-Server</a:t>
+            </a:r>
+            <a:endParaRPr lang="en-GB" dirty="0">
+              <a:solidFill>
+                <a:schemeClr val="bg1"/>
+              </a:solidFill>
+            </a:endParaRPr>
           </a:p>
         </p:txBody>
       </p:sp>
@@ -5188,7 +5256,7 @@
           <p:nvPr/>
         </p:nvPicPr>
         <p:blipFill>
-          <a:blip r:embed="rId2"/>
+          <a:blip r:embed="rId3"/>
           <a:stretch>
             <a:fillRect/>
           </a:stretch>
@@ -5241,8 +5309,28 @@
                   <a:schemeClr val="bg1"/>
                 </a:solidFill>
               </a:rPr>
-              <a:t>			barneylawrence.com/category/xml/</a:t>
-            </a:r>
+              <a:t>			</a:t>
+            </a:r>
+            <a:r>
+              <a:rPr lang="en-GB" dirty="0">
+                <a:solidFill>
+                  <a:schemeClr val="bg1"/>
+                </a:solidFill>
+                <a:hlinkClick r:id="rId2">
+                  <a:extLst>
+                    <a:ext uri="{A12FA001-AC4F-418D-AE19-62706E023703}">
+                      <ahyp:hlinkClr xmlns:ahyp="http://schemas.microsoft.com/office/drawing/2018/hyperlinkcolor" val="tx"/>
+                    </a:ext>
+                  </a:extLst>
+                </a:hlinkClick>
+              </a:rPr>
+              <a:t>barneylawrence.com/category/xml/</a:t>
+            </a:r>
+            <a:endParaRPr lang="en-GB" dirty="0">
+              <a:solidFill>
+                <a:schemeClr val="bg1"/>
+              </a:solidFill>
+            </a:endParaRPr>
           </a:p>
         </p:txBody>
       </p:sp>
@@ -5284,8 +5372,28 @@
                   <a:schemeClr val="bg1"/>
                 </a:solidFill>
               </a:rPr>
-              <a:t>			@SQLBarney</a:t>
-            </a:r>
+              <a:t>			</a:t>
+            </a:r>
+            <a:r>
+              <a:rPr lang="en-GB" dirty="0">
+                <a:solidFill>
+                  <a:schemeClr val="bg1"/>
+                </a:solidFill>
+                <a:hlinkClick r:id="rId4">
+                  <a:extLst>
+                    <a:ext uri="{A12FA001-AC4F-418D-AE19-62706E023703}">
+                      <ahyp:hlinkClr xmlns:ahyp="http://schemas.microsoft.com/office/drawing/2018/hyperlinkcolor" val="tx"/>
+                    </a:ext>
+                  </a:extLst>
+                </a:hlinkClick>
+              </a:rPr>
+              <a:t>@SQLBarney</a:t>
+            </a:r>
+            <a:endParaRPr lang="en-GB" dirty="0">
+              <a:solidFill>
+                <a:schemeClr val="bg1"/>
+              </a:solidFill>
+            </a:endParaRPr>
           </a:p>
         </p:txBody>
       </p:sp>
@@ -29330,49 +29438,6 @@
           </a:p>
         </p:txBody>
       </p:sp>
-      <p:sp>
-        <p:nvSpPr>
-          <p:cNvPr id="6" name="TextBox 5">
-            <a:extLst>
-              <a:ext uri="{FF2B5EF4-FFF2-40B4-BE49-F238E27FC236}">
-                <a16:creationId xmlns:a16="http://schemas.microsoft.com/office/drawing/2014/main" id="{3BD2DF90-3EFD-4DF0-8176-9814910A61A8}"/>
-              </a:ext>
-            </a:extLst>
-          </p:cNvPr>
-          <p:cNvSpPr txBox="1"/>
-          <p:nvPr/>
-        </p:nvSpPr>
-        <p:spPr>
-          <a:xfrm>
-            <a:off x="407281" y="6067004"/>
-            <a:ext cx="7371005" cy="369332"/>
-          </a:xfrm>
-          <a:prstGeom prst="rect">
-            <a:avLst/>
-          </a:prstGeom>
-          <a:noFill/>
-        </p:spPr>
-        <p:txBody>
-          <a:bodyPr wrap="square">
-            <a:spAutoFit/>
-          </a:bodyPr>
-          <a:lstStyle/>
-          <a:p>
-            <a:r>
-              <a:rPr lang="en-GB" dirty="0"/>
-              <a:t>SQL Notebooks: </a:t>
-            </a:r>
-            <a:r>
-              <a:rPr lang="en-GB" dirty="0">
-                <a:solidFill>
-                  <a:schemeClr val="bg1"/>
-                </a:solidFill>
-              </a:rPr>
-              <a:t>	github.com/BarneyLawrence/XML-Queries-In-SQL-Server</a:t>
-            </a:r>
-          </a:p>
-        </p:txBody>
-      </p:sp>
       <p:pic>
         <p:nvPicPr>
           <p:cNvPr id="8" name="Picture 7" descr="Qr code&#10;&#10;Description automatically generated">
@@ -29405,10 +29470,73 @@
       </p:pic>
       <p:sp>
         <p:nvSpPr>
-          <p:cNvPr id="10" name="TextBox 9">
+          <p:cNvPr id="11" name="TextBox 10">
             <a:extLst>
               <a:ext uri="{FF2B5EF4-FFF2-40B4-BE49-F238E27FC236}">
-                <a16:creationId xmlns:a16="http://schemas.microsoft.com/office/drawing/2014/main" id="{D8599FE1-AF8D-4CDB-B732-496E0878D042}"/>
+                <a16:creationId xmlns:a16="http://schemas.microsoft.com/office/drawing/2014/main" id="{B2B2729D-D84E-48E6-B116-7FBDC8C5FCB6}"/>
+              </a:ext>
+            </a:extLst>
+          </p:cNvPr>
+          <p:cNvSpPr txBox="1"/>
+          <p:nvPr/>
+        </p:nvSpPr>
+        <p:spPr>
+          <a:xfrm>
+            <a:off x="407281" y="6067004"/>
+            <a:ext cx="7371005" cy="369332"/>
+          </a:xfrm>
+          <a:prstGeom prst="rect">
+            <a:avLst/>
+          </a:prstGeom>
+          <a:noFill/>
+        </p:spPr>
+        <p:txBody>
+          <a:bodyPr wrap="square">
+            <a:spAutoFit/>
+          </a:bodyPr>
+          <a:lstStyle/>
+          <a:p>
+            <a:r>
+              <a:rPr lang="en-GB" dirty="0"/>
+              <a:t>SQL Notebooks: </a:t>
+            </a:r>
+            <a:r>
+              <a:rPr lang="en-GB" dirty="0">
+                <a:solidFill>
+                  <a:schemeClr val="bg1"/>
+                </a:solidFill>
+              </a:rPr>
+              <a:t>	</a:t>
+            </a:r>
+            <a:r>
+              <a:rPr lang="en-GB" dirty="0">
+                <a:solidFill>
+                  <a:schemeClr val="bg1"/>
+                </a:solidFill>
+                <a:hlinkClick r:id="rId3">
+                  <a:extLst>
+                    <a:ext uri="{A12FA001-AC4F-418D-AE19-62706E023703}">
+                      <ahyp:hlinkClr xmlns:ahyp="http://schemas.microsoft.com/office/drawing/2018/hyperlinkcolor" val="tx"/>
+                    </a:ext>
+                  </a:extLst>
+                </a:hlinkClick>
+              </a:rPr>
+              <a:t>github.com/BarneyLawrence/XML-Queries-In-SQL-Server</a:t>
+            </a:r>
+            <a:endParaRPr lang="en-GB" dirty="0">
+              <a:solidFill>
+                <a:schemeClr val="bg1"/>
+              </a:solidFill>
+            </a:endParaRPr>
+          </a:p>
+        </p:txBody>
+      </p:sp>
+      <p:sp>
+        <p:nvSpPr>
+          <p:cNvPr id="12" name="TextBox 11">
+            <a:extLst>
+              <a:ext uri="{FF2B5EF4-FFF2-40B4-BE49-F238E27FC236}">
+                <a16:creationId xmlns:a16="http://schemas.microsoft.com/office/drawing/2014/main" id="{4B152674-3832-4270-8A03-446930DF4B15}"/>
               </a:ext>
             </a:extLst>
           </p:cNvPr>
@@ -29441,17 +29569,37 @@
                   <a:schemeClr val="bg1"/>
                 </a:solidFill>
               </a:rPr>
-              <a:t>			barneylawrence.com/category/xml/</a:t>
-            </a:r>
+              <a:t>			</a:t>
+            </a:r>
+            <a:r>
+              <a:rPr lang="en-GB" dirty="0">
+                <a:solidFill>
+                  <a:schemeClr val="bg1"/>
+                </a:solidFill>
+                <a:hlinkClick r:id="rId3">
+                  <a:extLst>
+                    <a:ext uri="{A12FA001-AC4F-418D-AE19-62706E023703}">
+                      <ahyp:hlinkClr xmlns:ahyp="http://schemas.microsoft.com/office/drawing/2018/hyperlinkcolor" val="tx"/>
+                    </a:ext>
+                  </a:extLst>
+                </a:hlinkClick>
+              </a:rPr>
+              <a:t>barneylawrence.com/category/xml/</a:t>
+            </a:r>
+            <a:endParaRPr lang="en-GB" dirty="0">
+              <a:solidFill>
+                <a:schemeClr val="bg1"/>
+              </a:solidFill>
+            </a:endParaRPr>
           </a:p>
         </p:txBody>
       </p:sp>
       <p:sp>
         <p:nvSpPr>
-          <p:cNvPr id="9" name="TextBox 8">
+          <p:cNvPr id="13" name="TextBox 12">
             <a:extLst>
               <a:ext uri="{FF2B5EF4-FFF2-40B4-BE49-F238E27FC236}">
-                <a16:creationId xmlns:a16="http://schemas.microsoft.com/office/drawing/2014/main" id="{3BEEB7D4-FD64-4522-A65E-FCD81DEC35CD}"/>
+                <a16:creationId xmlns:a16="http://schemas.microsoft.com/office/drawing/2014/main" id="{032792EF-B0A8-4A22-A9FF-74A0ED304B49}"/>
               </a:ext>
             </a:extLst>
           </p:cNvPr>
@@ -29484,8 +29632,28 @@
                   <a:schemeClr val="bg1"/>
                 </a:solidFill>
               </a:rPr>
-              <a:t>			@SQLBarney</a:t>
-            </a:r>
+              <a:t>			</a:t>
+            </a:r>
+            <a:r>
+              <a:rPr lang="en-GB" dirty="0">
+                <a:solidFill>
+                  <a:schemeClr val="bg1"/>
+                </a:solidFill>
+                <a:hlinkClick r:id="rId4">
+                  <a:extLst>
+                    <a:ext uri="{A12FA001-AC4F-418D-AE19-62706E023703}">
+                      <ahyp:hlinkClr xmlns:ahyp="http://schemas.microsoft.com/office/drawing/2018/hyperlinkcolor" val="tx"/>
+                    </a:ext>
+                  </a:extLst>
+                </a:hlinkClick>
+              </a:rPr>
+              <a:t>@SQLBarney</a:t>
+            </a:r>
+            <a:endParaRPr lang="en-GB" dirty="0">
+              <a:solidFill>
+                <a:schemeClr val="bg1"/>
+              </a:solidFill>
+            </a:endParaRPr>
           </a:p>
         </p:txBody>
       </p:sp>

</xml_diff>